<commit_message>
add attendance slide reminder
</commit_message>
<xml_diff>
--- a/lessons/C_Sentiment_Unsupervised/Day3_liveA_SentimentReview.pptx
+++ b/lessons/C_Sentiment_Unsupervised/Day3_liveA_SentimentReview.pptx
@@ -5,22 +5,23 @@
     <p:sldMasterId id="2147483660" r:id="rId1"/>
   </p:sldMasterIdLst>
   <p:notesMasterIdLst>
-    <p:notesMasterId r:id="rId15"/>
+    <p:notesMasterId r:id="rId16"/>
   </p:notesMasterIdLst>
   <p:sldIdLst>
-    <p:sldId id="735" r:id="rId2"/>
-    <p:sldId id="808" r:id="rId3"/>
-    <p:sldId id="833" r:id="rId4"/>
-    <p:sldId id="834" r:id="rId5"/>
-    <p:sldId id="835" r:id="rId6"/>
-    <p:sldId id="832" r:id="rId7"/>
-    <p:sldId id="820" r:id="rId8"/>
-    <p:sldId id="819" r:id="rId9"/>
-    <p:sldId id="821" r:id="rId10"/>
-    <p:sldId id="740" r:id="rId11"/>
-    <p:sldId id="822" r:id="rId12"/>
-    <p:sldId id="823" r:id="rId13"/>
-    <p:sldId id="824" r:id="rId14"/>
+    <p:sldId id="836" r:id="rId2"/>
+    <p:sldId id="735" r:id="rId3"/>
+    <p:sldId id="808" r:id="rId4"/>
+    <p:sldId id="833" r:id="rId5"/>
+    <p:sldId id="834" r:id="rId6"/>
+    <p:sldId id="835" r:id="rId7"/>
+    <p:sldId id="832" r:id="rId8"/>
+    <p:sldId id="820" r:id="rId9"/>
+    <p:sldId id="819" r:id="rId10"/>
+    <p:sldId id="821" r:id="rId11"/>
+    <p:sldId id="740" r:id="rId12"/>
+    <p:sldId id="822" r:id="rId13"/>
+    <p:sldId id="823" r:id="rId14"/>
+    <p:sldId id="824" r:id="rId15"/>
   </p:sldIdLst>
   <p:sldSz cx="9144000" cy="6858000" type="screen4x3"/>
   <p:notesSz cx="6858000" cy="9144000"/>
@@ -5002,7 +5003,7 @@
           <a:p>
             <a:fld id="{B0C0A60C-850A-4EA4-9C14-A8FE98B94505}" type="datetimeFigureOut">
               <a:rPr lang="en-US" smtClean="0"/>
-              <a:t>1/5/21</a:t>
+              <a:t>1/10/21</a:t>
             </a:fld>
             <a:endParaRPr lang="en-US"/>
           </a:p>
@@ -5401,7 +5402,7 @@
           <a:p>
             <a:fld id="{5738B90E-0779-4C36-915C-6F05FCD89456}" type="datetime1">
               <a:rPr lang="en-US" smtClean="0"/>
-              <a:t>1/5/21</a:t>
+              <a:t>1/10/21</a:t>
             </a:fld>
             <a:endParaRPr lang="en-US"/>
           </a:p>
@@ -5598,7 +5599,7 @@
           <a:p>
             <a:fld id="{7B9EA29D-D431-42FE-B7B6-AAE4454C77D3}" type="datetime1">
               <a:rPr lang="en-US" smtClean="0"/>
-              <a:t>1/5/21</a:t>
+              <a:t>1/10/21</a:t>
             </a:fld>
             <a:endParaRPr lang="en-US"/>
           </a:p>
@@ -5953,7 +5954,7 @@
           <a:p>
             <a:fld id="{690D8A1E-EA8F-46C1-B891-AE0C00D9C314}" type="datetime1">
               <a:rPr lang="en-US" smtClean="0"/>
-              <a:t>1/5/21</a:t>
+              <a:t>1/10/21</a:t>
             </a:fld>
             <a:endParaRPr lang="en-US"/>
           </a:p>
@@ -6261,7 +6262,7 @@
           <a:p>
             <a:fld id="{D753EFC8-4232-4598-94F6-94C0EBAFC469}" type="datetime1">
               <a:rPr lang="en-US" smtClean="0"/>
-              <a:t>1/5/21</a:t>
+              <a:t>1/10/21</a:t>
             </a:fld>
             <a:endParaRPr lang="en-US"/>
           </a:p>
@@ -6590,7 +6591,7 @@
           <a:p>
             <a:fld id="{F3161074-1C18-4AE7-957D-F18524378C85}" type="datetime1">
               <a:rPr lang="en-US" smtClean="0"/>
-              <a:t>1/5/21</a:t>
+              <a:t>1/10/21</a:t>
             </a:fld>
             <a:endParaRPr lang="en-US"/>
           </a:p>
@@ -6843,7 +6844,7 @@
           <a:p>
             <a:fld id="{69BE256C-8D9A-4404-B47D-41A1AE514425}" type="datetime1">
               <a:rPr lang="en-US" smtClean="0"/>
-              <a:t>1/5/21</a:t>
+              <a:t>1/10/21</a:t>
             </a:fld>
             <a:endParaRPr lang="en-US"/>
           </a:p>
@@ -7291,7 +7292,7 @@
           <a:p>
             <a:fld id="{66CB2154-9035-4012-8189-BAAB61C5A5EE}" type="datetime1">
               <a:rPr lang="en-US" smtClean="0"/>
-              <a:t>1/5/21</a:t>
+              <a:t>1/10/21</a:t>
             </a:fld>
             <a:endParaRPr lang="en-US"/>
           </a:p>
@@ -7479,7 +7480,7 @@
           <a:p>
             <a:fld id="{6700A58B-DD98-43D0-B791-721480A02982}" type="datetime1">
               <a:rPr lang="en-US" smtClean="0"/>
-              <a:t>1/5/21</a:t>
+              <a:t>1/10/21</a:t>
             </a:fld>
             <a:endParaRPr lang="en-US"/>
           </a:p>
@@ -7685,7 +7686,7 @@
           <a:p>
             <a:fld id="{7DB6E382-4F61-4E24-BE1A-377EC83D0E3A}" type="datetime1">
               <a:rPr lang="en-US" smtClean="0"/>
-              <a:t>1/5/21</a:t>
+              <a:t>1/10/21</a:t>
             </a:fld>
             <a:endParaRPr lang="en-US"/>
           </a:p>
@@ -8091,7 +8092,7 @@
           <a:p>
             <a:fld id="{4142EED6-FC16-45B9-B8C4-2BC5DBA88325}" type="datetime1">
               <a:rPr lang="en-US" smtClean="0"/>
-              <a:t>1/5/21</a:t>
+              <a:t>1/10/21</a:t>
             </a:fld>
             <a:endParaRPr lang="en-US"/>
           </a:p>
@@ -8423,7 +8424,7 @@
           <a:p>
             <a:fld id="{DF59512B-4F1D-43D7-8819-2F53FEF69650}" type="datetime1">
               <a:rPr lang="en-US" smtClean="0"/>
-              <a:t>1/5/21</a:t>
+              <a:t>1/10/21</a:t>
             </a:fld>
             <a:endParaRPr lang="en-US"/>
           </a:p>
@@ -8713,7 +8714,7 @@
           <a:p>
             <a:fld id="{08437B94-E2BF-44DC-ADC5-B05FC9934E9D}" type="datetime1">
               <a:rPr lang="en-US" smtClean="0"/>
-              <a:t>1/5/21</a:t>
+              <a:t>1/10/21</a:t>
             </a:fld>
             <a:endParaRPr lang="en-US"/>
           </a:p>
@@ -9154,6 +9155,17 @@
 <file path=ppt/slides/slide1.xml><?xml version="1.0" encoding="utf-8"?>
 <p:sld xmlns:a="http://schemas.openxmlformats.org/drawingml/2006/main" xmlns:r="http://schemas.openxmlformats.org/officeDocument/2006/relationships" xmlns:p="http://schemas.openxmlformats.org/presentationml/2006/main">
   <p:cSld>
+    <p:bg>
+      <p:bgPr>
+        <a:solidFill>
+          <a:schemeClr val="bg1">
+            <a:tint val="95000"/>
+            <a:satMod val="170000"/>
+          </a:schemeClr>
+        </a:solidFill>
+        <a:effectLst/>
+      </p:bgPr>
+    </p:bg>
     <p:spTree>
       <p:nvGrpSpPr>
         <p:cNvPr id="1" name=""/>
@@ -9170,40 +9182,10 @@
       </p:grpSpPr>
       <p:sp>
         <p:nvSpPr>
-          <p:cNvPr id="2" name="Date Placeholder 1">
-            <a:extLst>
-              <a:ext uri="{FF2B5EF4-FFF2-40B4-BE49-F238E27FC236}">
-                <a16:creationId xmlns:a16="http://schemas.microsoft.com/office/drawing/2014/main" id="{C3CAEBDC-A022-42FC-8B92-BDD83F961C50}"/>
-              </a:ext>
-            </a:extLst>
-          </p:cNvPr>
-          <p:cNvSpPr>
-            <a:spLocks noGrp="1"/>
-          </p:cNvSpPr>
-          <p:nvPr>
-            <p:ph type="dt" sz="half" idx="10"/>
-          </p:nvPr>
-        </p:nvSpPr>
-        <p:spPr/>
-        <p:txBody>
-          <a:bodyPr/>
-          <a:lstStyle/>
-          <a:p>
-            <a:fld id="{6700A58B-DD98-43D0-B791-721480A02982}" type="datetime1">
-              <a:rPr lang="en-US" smtClean="0"/>
-              <a:pPr/>
-              <a:t>1/5/21</a:t>
-            </a:fld>
-            <a:endParaRPr lang="en-US"/>
-          </a:p>
-        </p:txBody>
-      </p:sp>
-      <p:sp>
-        <p:nvSpPr>
           <p:cNvPr id="3" name="Title 2">
             <a:extLst>
               <a:ext uri="{FF2B5EF4-FFF2-40B4-BE49-F238E27FC236}">
-                <a16:creationId xmlns:a16="http://schemas.microsoft.com/office/drawing/2014/main" id="{37B78173-5947-4F35-9667-F563D71FF454}"/>
+                <a16:creationId xmlns:a16="http://schemas.microsoft.com/office/drawing/2014/main" id="{AB93F023-550A-B048-9F7B-0E6F2A10EDC0}"/>
               </a:ext>
             </a:extLst>
           </p:cNvPr>
@@ -9216,106 +9198,135 @@
         </p:nvSpPr>
         <p:spPr>
           <a:xfrm>
-            <a:off x="102476" y="365126"/>
-            <a:ext cx="8939048" cy="591477"/>
+            <a:off x="5598460" y="1783959"/>
+            <a:ext cx="3065480" cy="2889114"/>
           </a:xfrm>
         </p:spPr>
         <p:txBody>
-          <a:bodyPr/>
+          <a:bodyPr vert="horz" lIns="91440" tIns="45720" rIns="91440" bIns="45720" rtlCol="0" anchor="b">
+            <a:normAutofit/>
+          </a:bodyPr>
           <a:lstStyle/>
           <a:p>
-            <a:r>
-              <a:rPr lang="en-US" dirty="0" err="1"/>
-              <a:t>Zipf’s</a:t>
-            </a:r>
-            <a:r>
-              <a:rPr lang="en-US" dirty="0"/>
-              <a:t> Law: Our words  are less diverse than we think</a:t>
-            </a:r>
+            <a:pPr defTabSz="914400"/>
+            <a:r>
+              <a:rPr lang="en-US" sz="4700" dirty="0"/>
+              <a:t>Let’s make sure we’re </a:t>
+            </a:r>
+            <a:r>
+              <a:rPr lang="en-US" sz="4700"/>
+              <a:t>all present.</a:t>
+            </a:r>
+            <a:endParaRPr lang="en-US" sz="4700" dirty="0"/>
           </a:p>
         </p:txBody>
       </p:sp>
       <p:sp>
         <p:nvSpPr>
-          <p:cNvPr id="14" name="Footer Placeholder 5">
+          <p:cNvPr id="71" name="Freeform: Shape 70">
             <a:extLst>
               <a:ext uri="{FF2B5EF4-FFF2-40B4-BE49-F238E27FC236}">
-                <a16:creationId xmlns:a16="http://schemas.microsoft.com/office/drawing/2014/main" id="{545F3542-284F-40CB-AA56-2D2C37D0AC7A}"/>
+                <a16:creationId xmlns:a16="http://schemas.microsoft.com/office/drawing/2014/main" id="{E49CC64F-7275-4E33-961B-0C5CDC439875}"/>
+              </a:ext>
+              <a:ext uri="{C183D7F6-B498-43B3-948B-1728B52AA6E4}">
+                <adec:decorative xmlns:adec="http://schemas.microsoft.com/office/drawing/2017/decorative" val="1"/>
               </a:ext>
             </a:extLst>
           </p:cNvPr>
           <p:cNvSpPr>
-            <a:spLocks noGrp="1"/>
+            <a:spLocks noGrp="1" noRot="1" noChangeAspect="1" noMove="1" noResize="1" noEditPoints="1" noAdjustHandles="1" noChangeArrowheads="1" noChangeShapeType="1" noTextEdit="1"/>
           </p:cNvSpPr>
           <p:nvPr>
-            <p:ph type="ftr" sz="quarter" idx="3"/>
+            <p:extLst>
+              <p:ext uri="{386F3935-93C4-4BCD-93E2-E3B085C9AB24}">
+                <p16:designElem xmlns:p16="http://schemas.microsoft.com/office/powerpoint/2015/main" val="1"/>
+              </p:ext>
+            </p:extLst>
           </p:nvPr>
         </p:nvSpPr>
-        <p:spPr/>
-        <p:txBody>
-          <a:bodyPr/>
-          <a:lstStyle/>
-          <a:p>
-            <a:r>
-              <a:rPr lang="en-US"/>
-              <a:t>Kwartler</a:t>
-            </a:r>
-            <a:endParaRPr lang="en-US" dirty="0"/>
-          </a:p>
-        </p:txBody>
-      </p:sp>
-      <p:sp>
-        <p:nvSpPr>
-          <p:cNvPr id="4" name="Slide Number Placeholder 3">
-            <a:extLst>
-              <a:ext uri="{FF2B5EF4-FFF2-40B4-BE49-F238E27FC236}">
-                <a16:creationId xmlns:a16="http://schemas.microsoft.com/office/drawing/2014/main" id="{A93F5FA2-CF1A-47D7-B82C-0D8B23383AC1}"/>
-              </a:ext>
-            </a:extLst>
-          </p:cNvPr>
-          <p:cNvSpPr>
-            <a:spLocks noGrp="1"/>
-          </p:cNvSpPr>
-          <p:nvPr>
-            <p:ph type="sldNum" sz="quarter" idx="4"/>
-          </p:nvPr>
-        </p:nvSpPr>
-        <p:spPr/>
-        <p:txBody>
-          <a:bodyPr/>
-          <a:lstStyle/>
-          <a:p>
-            <a:fld id="{37290FF7-652B-4475-AEAB-8B1A5D23AE09}" type="slidenum">
-              <a:rPr lang="en-US" smtClean="0"/>
-              <a:pPr/>
-              <a:t>1</a:t>
-            </a:fld>
-            <a:endParaRPr lang="en-US"/>
-          </a:p>
-        </p:txBody>
-      </p:sp>
-      <p:sp>
-        <p:nvSpPr>
-          <p:cNvPr id="9" name="Rectangle 8">
-            <a:extLst>
-              <a:ext uri="{FF2B5EF4-FFF2-40B4-BE49-F238E27FC236}">
-                <a16:creationId xmlns:a16="http://schemas.microsoft.com/office/drawing/2014/main" id="{0333D30C-20D1-44FC-B08B-ACA17FBC705D}"/>
-              </a:ext>
-            </a:extLst>
-          </p:cNvPr>
-          <p:cNvSpPr/>
-          <p:nvPr/>
-        </p:nvSpPr>
         <p:spPr>
-          <a:xfrm>
-            <a:off x="240631" y="5593976"/>
-            <a:ext cx="6536687" cy="510989"/>
+          <a:xfrm flipH="1" flipV="1">
+            <a:off x="0" y="0"/>
+            <a:ext cx="5391039" cy="6858000"/>
           </a:xfrm>
-          <a:prstGeom prst="rect">
+          <a:custGeom>
             <a:avLst/>
-          </a:prstGeom>
+            <a:gdLst>
+              <a:gd name="connsiteX0" fmla="*/ 7188051 w 7188051"/>
+              <a:gd name="connsiteY0" fmla="*/ 6858000 h 6858000"/>
+              <a:gd name="connsiteX1" fmla="*/ 108694 w 7188051"/>
+              <a:gd name="connsiteY1" fmla="*/ 6858000 h 6858000"/>
+              <a:gd name="connsiteX2" fmla="*/ 79127 w 7188051"/>
+              <a:gd name="connsiteY2" fmla="*/ 6681235 h 6858000"/>
+              <a:gd name="connsiteX3" fmla="*/ 0 w 7188051"/>
+              <a:gd name="connsiteY3" fmla="*/ 5565888 h 6858000"/>
+              <a:gd name="connsiteX4" fmla="*/ 2190696 w 7188051"/>
+              <a:gd name="connsiteY4" fmla="*/ 145339 h 6858000"/>
+              <a:gd name="connsiteX5" fmla="*/ 2339431 w 7188051"/>
+              <a:gd name="connsiteY5" fmla="*/ 0 h 6858000"/>
+              <a:gd name="connsiteX6" fmla="*/ 7188051 w 7188051"/>
+              <a:gd name="connsiteY6" fmla="*/ 0 h 6858000"/>
+            </a:gdLst>
+            <a:ahLst/>
+            <a:cxnLst>
+              <a:cxn ang="0">
+                <a:pos x="connsiteX0" y="connsiteY0"/>
+              </a:cxn>
+              <a:cxn ang="0">
+                <a:pos x="connsiteX1" y="connsiteY1"/>
+              </a:cxn>
+              <a:cxn ang="0">
+                <a:pos x="connsiteX2" y="connsiteY2"/>
+              </a:cxn>
+              <a:cxn ang="0">
+                <a:pos x="connsiteX3" y="connsiteY3"/>
+              </a:cxn>
+              <a:cxn ang="0">
+                <a:pos x="connsiteX4" y="connsiteY4"/>
+              </a:cxn>
+              <a:cxn ang="0">
+                <a:pos x="connsiteX5" y="connsiteY5"/>
+              </a:cxn>
+              <a:cxn ang="0">
+                <a:pos x="connsiteX6" y="connsiteY6"/>
+              </a:cxn>
+            </a:cxnLst>
+            <a:rect l="l" t="t" r="r" b="b"/>
+            <a:pathLst>
+              <a:path w="7188051" h="6858000">
+                <a:moveTo>
+                  <a:pt x="7188051" y="6858000"/>
+                </a:moveTo>
+                <a:lnTo>
+                  <a:pt x="108694" y="6858000"/>
+                </a:lnTo>
+                <a:lnTo>
+                  <a:pt x="79127" y="6681235"/>
+                </a:lnTo>
+                <a:cubicBezTo>
+                  <a:pt x="26981" y="6316967"/>
+                  <a:pt x="0" y="5944579"/>
+                  <a:pt x="0" y="5565888"/>
+                </a:cubicBezTo>
+                <a:cubicBezTo>
+                  <a:pt x="0" y="3459953"/>
+                  <a:pt x="834428" y="1548908"/>
+                  <a:pt x="2190696" y="145339"/>
+                </a:cubicBezTo>
+                <a:lnTo>
+                  <a:pt x="2339431" y="0"/>
+                </a:lnTo>
+                <a:lnTo>
+                  <a:pt x="7188051" y="0"/>
+                </a:lnTo>
+                <a:close/>
+              </a:path>
+            </a:pathLst>
+          </a:custGeom>
           <a:solidFill>
-            <a:schemeClr val="accent3"/>
+            <a:schemeClr val="tx1">
+              <a:alpha val="80000"/>
+            </a:schemeClr>
           </a:solidFill>
           <a:ln>
             <a:noFill/>
@@ -9338,140 +9349,435 @@
           </a:fontRef>
         </p:style>
         <p:txBody>
-          <a:bodyPr rot="0" spcFirstLastPara="0" vertOverflow="overflow" horzOverflow="overflow" vert="horz" wrap="square" lIns="91440" tIns="45720" rIns="91440" bIns="45720" numCol="1" spcCol="0" rtlCol="0" fromWordArt="0" anchor="ctr" anchorCtr="0" forceAA="0" compatLnSpc="1">
-            <a:prstTxWarp prst="textNoShape">
-              <a:avLst/>
-            </a:prstTxWarp>
+          <a:bodyPr wrap="square" rtlCol="0" anchor="ctr">
             <a:noAutofit/>
           </a:bodyPr>
           <a:lstStyle/>
           <a:p>
             <a:pPr algn="ctr"/>
-            <a:r>
-              <a:rPr lang="en-US" sz="1400" dirty="0">
-                <a:solidFill>
-                  <a:schemeClr val="bg1"/>
-                </a:solidFill>
-              </a:rPr>
-              <a:t>Many words in natural language but also a steep decline in actual usage.  </a:t>
-            </a:r>
-          </a:p>
-          <a:p>
-            <a:pPr algn="ctr"/>
-            <a:r>
-              <a:rPr lang="en-US" sz="1400" dirty="0">
-                <a:solidFill>
-                  <a:schemeClr val="bg1"/>
-                </a:solidFill>
-              </a:rPr>
-              <a:t>Follows a predictable pattern.</a:t>
-            </a:r>
+            <a:endParaRPr lang="en-US"/>
           </a:p>
         </p:txBody>
       </p:sp>
-      <p:grpSp>
-        <p:nvGrpSpPr>
-          <p:cNvPr id="5" name="Group 4"/>
-          <p:cNvGrpSpPr/>
-          <p:nvPr/>
-        </p:nvGrpSpPr>
-        <p:grpSpPr>
-          <a:xfrm>
-            <a:off x="804505" y="1664188"/>
-            <a:ext cx="3689132" cy="2676504"/>
-            <a:chOff x="433759" y="2081047"/>
-            <a:chExt cx="3689132" cy="2676504"/>
-          </a:xfrm>
-        </p:grpSpPr>
-        <p:pic>
-          <p:nvPicPr>
-            <p:cNvPr id="7" name="Picture 2" descr="Image result for zipf's law">
-              <a:extLst>
-                <a:ext uri="{FF2B5EF4-FFF2-40B4-BE49-F238E27FC236}">
-                  <a16:creationId xmlns:a16="http://schemas.microsoft.com/office/drawing/2014/main" id="{E79F8C42-DDEC-484B-9AF4-5697CCAD2D27}"/>
-                </a:ext>
-              </a:extLst>
-            </p:cNvPr>
-            <p:cNvPicPr>
-              <a:picLocks noChangeAspect="1" noChangeArrowheads="1"/>
-            </p:cNvPicPr>
-            <p:nvPr/>
-          </p:nvPicPr>
-          <p:blipFill>
-            <a:blip r:embed="rId2" cstate="print">
-              <a:extLst>
-                <a:ext uri="{28A0092B-C50C-407E-A947-70E740481C1C}">
-                  <a14:useLocalDpi xmlns:a14="http://schemas.microsoft.com/office/drawing/2010/main" val="0"/>
-                </a:ext>
-              </a:extLst>
-            </a:blip>
-            <a:srcRect/>
-            <a:stretch>
-              <a:fillRect/>
-            </a:stretch>
-          </p:blipFill>
-          <p:spPr bwMode="auto">
-            <a:xfrm>
-              <a:off x="446024" y="2556649"/>
-              <a:ext cx="3664603" cy="2200902"/>
-            </a:xfrm>
-            <a:prstGeom prst="rect">
-              <a:avLst/>
-            </a:prstGeom>
-            <a:noFill/>
+      <p:pic>
+        <p:nvPicPr>
+          <p:cNvPr id="1026" name="Picture 2" descr="Me Looking for your attendance - | Make a Meme">
             <a:extLst>
-              <a:ext uri="{909E8E84-426E-40DD-AFC4-6F175D3DCCD1}">
-                <a14:hiddenFill xmlns:a14="http://schemas.microsoft.com/office/drawing/2010/main">
-                  <a:solidFill>
-                    <a:srgbClr val="FFFFFF"/>
-                  </a:solidFill>
-                </a14:hiddenFill>
+              <a:ext uri="{FF2B5EF4-FFF2-40B4-BE49-F238E27FC236}">
+                <a16:creationId xmlns:a16="http://schemas.microsoft.com/office/drawing/2014/main" id="{D77B21C3-BCF8-D84E-A200-79084351BFBF}"/>
               </a:ext>
             </a:extLst>
-          </p:spPr>
-        </p:pic>
-        <p:sp>
-          <p:nvSpPr>
-            <p:cNvPr id="15" name="TextBox 14"/>
-            <p:cNvSpPr txBox="1"/>
-            <p:nvPr/>
-          </p:nvSpPr>
-          <p:spPr>
-            <a:xfrm>
-              <a:off x="433759" y="2081047"/>
-              <a:ext cx="3689132" cy="369332"/>
-            </a:xfrm>
-            <a:prstGeom prst="rect">
-              <a:avLst/>
-            </a:prstGeom>
-            <a:solidFill>
-              <a:schemeClr val="accent2"/>
-            </a:solidFill>
-          </p:spPr>
-          <p:txBody>
-            <a:bodyPr wrap="square" rtlCol="0">
-              <a:spAutoFit/>
-            </a:bodyPr>
-            <a:lstStyle/>
-            <a:p>
-              <a:r>
-                <a:rPr lang="en-US" dirty="0">
-                  <a:solidFill>
-                    <a:schemeClr val="bg1"/>
-                  </a:solidFill>
-                </a:rPr>
-                <a:t>Another Example </a:t>
-              </a:r>
-            </a:p>
-          </p:txBody>
-        </p:sp>
-      </p:grpSp>
+          </p:cNvPr>
+          <p:cNvPicPr>
+            <a:picLocks noChangeAspect="1" noChangeArrowheads="1"/>
+          </p:cNvPicPr>
+          <p:nvPr/>
+        </p:nvPicPr>
+        <p:blipFill rotWithShape="1">
+          <a:blip r:embed="rId2">
+            <a:extLst>
+              <a:ext uri="{28A0092B-C50C-407E-A947-70E740481C1C}">
+                <a14:useLocalDpi xmlns:a14="http://schemas.microsoft.com/office/drawing/2010/main" val="0"/>
+              </a:ext>
+            </a:extLst>
+          </a:blip>
+          <a:srcRect l="7342" r="2758"/>
+          <a:stretch/>
+        </p:blipFill>
+        <p:spPr bwMode="auto">
+          <a:xfrm>
+            <a:off x="20" y="10"/>
+            <a:ext cx="5271352" cy="6857990"/>
+          </a:xfrm>
+          <a:custGeom>
+            <a:avLst/>
+            <a:gdLst/>
+            <a:ahLst/>
+            <a:cxnLst/>
+            <a:rect l="l" t="t" r="r" b="b"/>
+            <a:pathLst>
+              <a:path w="7028495" h="6858000">
+                <a:moveTo>
+                  <a:pt x="0" y="0"/>
+                </a:moveTo>
+                <a:lnTo>
+                  <a:pt x="6915668" y="0"/>
+                </a:lnTo>
+                <a:lnTo>
+                  <a:pt x="6952411" y="219663"/>
+                </a:lnTo>
+                <a:cubicBezTo>
+                  <a:pt x="7002551" y="569921"/>
+                  <a:pt x="7028495" y="927986"/>
+                  <a:pt x="7028495" y="1292112"/>
+                </a:cubicBezTo>
+                <a:cubicBezTo>
+                  <a:pt x="7028495" y="3343346"/>
+                  <a:pt x="6205186" y="5202289"/>
+                  <a:pt x="4870994" y="6556512"/>
+                </a:cubicBezTo>
+                <a:lnTo>
+                  <a:pt x="4556185" y="6858000"/>
+                </a:lnTo>
+                <a:lnTo>
+                  <a:pt x="0" y="6858000"/>
+                </a:lnTo>
+                <a:close/>
+              </a:path>
+            </a:pathLst>
+          </a:custGeom>
+          <a:noFill/>
+          <a:extLst>
+            <a:ext uri="{909E8E84-426E-40DD-AFC4-6F175D3DCCD1}">
+              <a14:hiddenFill xmlns:a14="http://schemas.microsoft.com/office/drawing/2010/main">
+                <a:solidFill>
+                  <a:srgbClr val="FFFFFF"/>
+                </a:solidFill>
+              </a14:hiddenFill>
+            </a:ext>
+          </a:extLst>
+        </p:spPr>
+      </p:pic>
+      <p:sp>
+        <p:nvSpPr>
+          <p:cNvPr id="2" name="Date Placeholder 1">
+            <a:extLst>
+              <a:ext uri="{FF2B5EF4-FFF2-40B4-BE49-F238E27FC236}">
+                <a16:creationId xmlns:a16="http://schemas.microsoft.com/office/drawing/2014/main" id="{F77D4BCD-5984-1F41-9E08-A18F0C4FE728}"/>
+              </a:ext>
+            </a:extLst>
+          </p:cNvPr>
+          <p:cNvSpPr>
+            <a:spLocks noGrp="1"/>
+          </p:cNvSpPr>
+          <p:nvPr>
+            <p:ph type="dt" sz="half" idx="10"/>
+          </p:nvPr>
+        </p:nvSpPr>
+        <p:spPr>
+          <a:xfrm>
+            <a:off x="6080289" y="694944"/>
+            <a:ext cx="2037618" cy="365760"/>
+          </a:xfrm>
+        </p:spPr>
+        <p:txBody>
+          <a:bodyPr vert="horz" lIns="91440" tIns="45720" rIns="91440" bIns="45720" rtlCol="0" anchor="ctr">
+            <a:normAutofit/>
+          </a:bodyPr>
+          <a:lstStyle/>
+          <a:p>
+            <a:pPr algn="r">
+              <a:spcAft>
+                <a:spcPts val="600"/>
+              </a:spcAft>
+              <a:defRPr/>
+            </a:pPr>
+            <a:fld id="{6700A58B-DD98-43D0-B791-721480A02982}" type="datetime1">
+              <a:rPr lang="en-US" sz="1000">
+                <a:solidFill>
+                  <a:schemeClr val="tx1">
+                    <a:alpha val="80000"/>
+                  </a:schemeClr>
+                </a:solidFill>
+                <a:latin typeface="Calibri" panose="020F0502020204030204"/>
+              </a:rPr>
+              <a:pPr algn="r">
+                <a:spcAft>
+                  <a:spcPts val="600"/>
+                </a:spcAft>
+                <a:defRPr/>
+              </a:pPr>
+              <a:t>1/10/21</a:t>
+            </a:fld>
+            <a:endParaRPr lang="en-US" sz="1000">
+              <a:solidFill>
+                <a:schemeClr val="tx1">
+                  <a:alpha val="80000"/>
+                </a:schemeClr>
+              </a:solidFill>
+              <a:latin typeface="Calibri" panose="020F0502020204030204"/>
+            </a:endParaRPr>
+          </a:p>
+        </p:txBody>
+      </p:sp>
+      <p:sp>
+        <p:nvSpPr>
+          <p:cNvPr id="5" name="Slide Number Placeholder 4">
+            <a:extLst>
+              <a:ext uri="{FF2B5EF4-FFF2-40B4-BE49-F238E27FC236}">
+                <a16:creationId xmlns:a16="http://schemas.microsoft.com/office/drawing/2014/main" id="{73883D85-442E-4140-AD87-016011DFC036}"/>
+              </a:ext>
+            </a:extLst>
+          </p:cNvPr>
+          <p:cNvSpPr>
+            <a:spLocks noGrp="1"/>
+          </p:cNvSpPr>
+          <p:nvPr>
+            <p:ph type="sldNum" sz="quarter" idx="4"/>
+          </p:nvPr>
+        </p:nvSpPr>
+        <p:spPr>
+          <a:xfrm>
+            <a:off x="8252460" y="603504"/>
+            <a:ext cx="411480" cy="548640"/>
+          </a:xfrm>
+          <a:prstGeom prst="ellipse">
+            <a:avLst/>
+          </a:prstGeom>
+          <a:solidFill>
+            <a:srgbClr val="7F7F7F"/>
+          </a:solidFill>
+        </p:spPr>
+        <p:txBody>
+          <a:bodyPr vert="horz" lIns="91440" tIns="45720" rIns="91440" bIns="45720" rtlCol="0" anchor="ctr">
+            <a:normAutofit/>
+          </a:bodyPr>
+          <a:lstStyle/>
+          <a:p>
+            <a:pPr algn="ctr">
+              <a:lnSpc>
+                <a:spcPct val="100000"/>
+              </a:lnSpc>
+              <a:spcAft>
+                <a:spcPts val="600"/>
+              </a:spcAft>
+              <a:defRPr/>
+            </a:pPr>
+            <a:fld id="{37290FF7-652B-4475-AEAB-8B1A5D23AE09}" type="slidenum">
+              <a:rPr lang="en-US" sz="1300">
+                <a:solidFill>
+                  <a:srgbClr val="FFFFFF"/>
+                </a:solidFill>
+                <a:latin typeface="Calibri" panose="020F0502020204030204"/>
+              </a:rPr>
+              <a:pPr algn="ctr">
+                <a:lnSpc>
+                  <a:spcPct val="100000"/>
+                </a:lnSpc>
+                <a:spcAft>
+                  <a:spcPts val="600"/>
+                </a:spcAft>
+                <a:defRPr/>
+              </a:pPr>
+              <a:t>1</a:t>
+            </a:fld>
+            <a:endParaRPr lang="en-US" sz="1300">
+              <a:solidFill>
+                <a:srgbClr val="FFFFFF"/>
+              </a:solidFill>
+              <a:latin typeface="Calibri" panose="020F0502020204030204"/>
+            </a:endParaRPr>
+          </a:p>
+        </p:txBody>
+      </p:sp>
+      <p:sp>
+        <p:nvSpPr>
+          <p:cNvPr id="4" name="Footer Placeholder 3">
+            <a:extLst>
+              <a:ext uri="{FF2B5EF4-FFF2-40B4-BE49-F238E27FC236}">
+                <a16:creationId xmlns:a16="http://schemas.microsoft.com/office/drawing/2014/main" id="{1F994E54-2B74-E246-8B0A-1F75849C0C45}"/>
+              </a:ext>
+            </a:extLst>
+          </p:cNvPr>
+          <p:cNvSpPr>
+            <a:spLocks noGrp="1"/>
+          </p:cNvSpPr>
+          <p:nvPr>
+            <p:ph type="ftr" sz="quarter" idx="3"/>
+          </p:nvPr>
+        </p:nvSpPr>
+        <p:spPr>
+          <a:xfrm>
+            <a:off x="5598459" y="6199631"/>
+            <a:ext cx="3065478" cy="365760"/>
+          </a:xfrm>
+        </p:spPr>
+        <p:txBody>
+          <a:bodyPr vert="horz" lIns="91440" tIns="45720" rIns="91440" bIns="45720" rtlCol="0" anchor="ctr">
+            <a:normAutofit/>
+          </a:bodyPr>
+          <a:lstStyle/>
+          <a:p>
+            <a:pPr algn="l">
+              <a:spcAft>
+                <a:spcPts val="600"/>
+              </a:spcAft>
+              <a:defRPr/>
+            </a:pPr>
+            <a:r>
+              <a:rPr lang="en-US" sz="1000" kern="1200">
+                <a:solidFill>
+                  <a:schemeClr val="tx1">
+                    <a:alpha val="80000"/>
+                  </a:schemeClr>
+                </a:solidFill>
+                <a:latin typeface="Calibri" panose="020F0502020204030204"/>
+                <a:ea typeface="+mn-ea"/>
+                <a:cs typeface="+mn-cs"/>
+              </a:rPr>
+              <a:t>Kwartler</a:t>
+            </a:r>
+          </a:p>
+        </p:txBody>
+      </p:sp>
+    </p:spTree>
+    <p:extLst>
+      <p:ext uri="{BB962C8B-B14F-4D97-AF65-F5344CB8AC3E}">
+        <p14:creationId xmlns:p14="http://schemas.microsoft.com/office/powerpoint/2010/main" val="1336369927"/>
+      </p:ext>
+    </p:extLst>
+  </p:cSld>
+  <p:clrMapOvr>
+    <a:overrideClrMapping bg1="dk1" tx1="lt1" bg2="dk2" tx2="lt2" accent1="accent1" accent2="accent2" accent3="accent3" accent4="accent4" accent5="accent5" accent6="accent6" hlink="hlink" folHlink="folHlink"/>
+  </p:clrMapOvr>
+</p:sld>
+</file>
+
+<file path=ppt/slides/slide10.xml><?xml version="1.0" encoding="utf-8"?>
+<p:sld xmlns:a="http://schemas.openxmlformats.org/drawingml/2006/main" xmlns:r="http://schemas.openxmlformats.org/officeDocument/2006/relationships" xmlns:p="http://schemas.openxmlformats.org/presentationml/2006/main">
+  <p:cSld>
+    <p:spTree>
+      <p:nvGrpSpPr>
+        <p:cNvPr id="1" name=""/>
+        <p:cNvGrpSpPr/>
+        <p:nvPr/>
+      </p:nvGrpSpPr>
+      <p:grpSpPr>
+        <a:xfrm>
+          <a:off x="0" y="0"/>
+          <a:ext cx="0" cy="0"/>
+          <a:chOff x="0" y="0"/>
+          <a:chExt cx="0" cy="0"/>
+        </a:xfrm>
+      </p:grpSpPr>
+      <p:sp>
+        <p:nvSpPr>
+          <p:cNvPr id="2" name="Date Placeholder 1"/>
+          <p:cNvSpPr>
+            <a:spLocks noGrp="1"/>
+          </p:cNvSpPr>
+          <p:nvPr>
+            <p:ph type="dt" sz="half" idx="10"/>
+          </p:nvPr>
+        </p:nvSpPr>
+        <p:spPr/>
+        <p:txBody>
+          <a:bodyPr/>
+          <a:lstStyle/>
+          <a:p>
+            <a:fld id="{6700A58B-DD98-43D0-B791-721480A02982}" type="datetime1">
+              <a:rPr lang="en-US" smtClean="0"/>
+              <a:t>1/10/21</a:t>
+            </a:fld>
+            <a:endParaRPr lang="en-US"/>
+          </a:p>
+        </p:txBody>
+      </p:sp>
+      <p:sp>
+        <p:nvSpPr>
+          <p:cNvPr id="3" name="Title 2"/>
+          <p:cNvSpPr>
+            <a:spLocks noGrp="1"/>
+          </p:cNvSpPr>
+          <p:nvPr>
+            <p:ph type="title"/>
+          </p:nvPr>
+        </p:nvSpPr>
+        <p:spPr/>
+        <p:txBody>
+          <a:bodyPr/>
+          <a:lstStyle/>
+          <a:p>
+            <a:r>
+              <a:rPr lang="en-US" dirty="0"/>
+              <a:t>In this exercise we will examine song lyrics</a:t>
+            </a:r>
+          </a:p>
+        </p:txBody>
+      </p:sp>
+      <p:sp>
+        <p:nvSpPr>
+          <p:cNvPr id="4" name="Footer Placeholder 3"/>
+          <p:cNvSpPr>
+            <a:spLocks noGrp="1"/>
+          </p:cNvSpPr>
+          <p:nvPr>
+            <p:ph type="ftr" sz="quarter" idx="3"/>
+          </p:nvPr>
+        </p:nvSpPr>
+        <p:spPr/>
+        <p:txBody>
+          <a:bodyPr/>
+          <a:lstStyle/>
+          <a:p>
+            <a:r>
+              <a:rPr lang="en-US"/>
+              <a:t>Kwartler</a:t>
+            </a:r>
+            <a:endParaRPr lang="en-US" dirty="0"/>
+          </a:p>
+        </p:txBody>
+      </p:sp>
+      <p:sp>
+        <p:nvSpPr>
+          <p:cNvPr id="5" name="Slide Number Placeholder 4"/>
+          <p:cNvSpPr>
+            <a:spLocks noGrp="1"/>
+          </p:cNvSpPr>
+          <p:nvPr>
+            <p:ph type="sldNum" sz="quarter" idx="4"/>
+          </p:nvPr>
+        </p:nvSpPr>
+        <p:spPr/>
+        <p:txBody>
+          <a:bodyPr/>
+          <a:lstStyle/>
+          <a:p>
+            <a:fld id="{37290FF7-652B-4475-AEAB-8B1A5D23AE09}" type="slidenum">
+              <a:rPr lang="en-US" smtClean="0"/>
+              <a:pPr/>
+              <a:t>10</a:t>
+            </a:fld>
+            <a:endParaRPr lang="en-US" dirty="0"/>
+          </a:p>
+        </p:txBody>
+      </p:sp>
+      <p:pic>
+        <p:nvPicPr>
+          <p:cNvPr id="6" name="Picture 5">
+            <a:extLst>
+              <a:ext uri="{FF2B5EF4-FFF2-40B4-BE49-F238E27FC236}">
+                <a16:creationId xmlns:a16="http://schemas.microsoft.com/office/drawing/2014/main" id="{43321A06-9471-48C7-B813-FF43E5D3F26A}"/>
+              </a:ext>
+            </a:extLst>
+          </p:cNvPr>
+          <p:cNvPicPr>
+            <a:picLocks noChangeAspect="1"/>
+          </p:cNvPicPr>
+          <p:nvPr/>
+        </p:nvPicPr>
+        <p:blipFill>
+          <a:blip r:embed="rId2"/>
+          <a:stretch>
+            <a:fillRect/>
+          </a:stretch>
+        </p:blipFill>
+        <p:spPr>
+          <a:xfrm>
+            <a:off x="644442" y="1264820"/>
+            <a:ext cx="6315075" cy="3943350"/>
+          </a:xfrm>
+          <a:prstGeom prst="rect">
+            <a:avLst/>
+          </a:prstGeom>
+        </p:spPr>
+      </p:pic>
       <p:cxnSp>
         <p:nvCxnSpPr>
-          <p:cNvPr id="12" name="Straight Connector 11">
+          <p:cNvPr id="9" name="Straight Connector 8">
             <a:extLst>
               <a:ext uri="{FF2B5EF4-FFF2-40B4-BE49-F238E27FC236}">
-                <a16:creationId xmlns:a16="http://schemas.microsoft.com/office/drawing/2014/main" id="{CEF19589-F4F2-C44D-8682-D4C73D133BE6}"/>
+                <a16:creationId xmlns:a16="http://schemas.microsoft.com/office/drawing/2014/main" id="{EDB8A8B8-B746-EF49-AA0A-1EB9AE31C3E7}"/>
               </a:ext>
             </a:extLst>
           </p:cNvPr>
@@ -9511,10 +9817,10 @@
       </p:cxnSp>
       <p:cxnSp>
         <p:nvCxnSpPr>
-          <p:cNvPr id="13" name="Straight Connector 12">
+          <p:cNvPr id="10" name="Straight Connector 9">
             <a:extLst>
               <a:ext uri="{FF2B5EF4-FFF2-40B4-BE49-F238E27FC236}">
-                <a16:creationId xmlns:a16="http://schemas.microsoft.com/office/drawing/2014/main" id="{C39F794A-1735-C748-A1C4-E87AAEC8E987}"/>
+                <a16:creationId xmlns:a16="http://schemas.microsoft.com/office/drawing/2014/main" id="{3E861DD3-4CF5-3F4B-96A7-76FFEDD98FCF}"/>
               </a:ext>
             </a:extLst>
           </p:cNvPr>
@@ -9555,7 +9861,7 @@
     </p:spTree>
     <p:extLst>
       <p:ext uri="{BB962C8B-B14F-4D97-AF65-F5344CB8AC3E}">
-        <p14:creationId xmlns:p14="http://schemas.microsoft.com/office/powerpoint/2010/main" val="2151883977"/>
+        <p14:creationId xmlns:p14="http://schemas.microsoft.com/office/powerpoint/2010/main" val="2412190367"/>
       </p:ext>
     </p:extLst>
   </p:cSld>
@@ -9565,7 +9871,7 @@
 </p:sld>
 </file>
 
-<file path=ppt/slides/slide10.xml><?xml version="1.0" encoding="utf-8"?>
+<file path=ppt/slides/slide11.xml><?xml version="1.0" encoding="utf-8"?>
 <p:sld xmlns:a="http://schemas.openxmlformats.org/drawingml/2006/main" xmlns:r="http://schemas.openxmlformats.org/officeDocument/2006/relationships" xmlns:p="http://schemas.openxmlformats.org/presentationml/2006/main">
   <p:cSld>
     <p:spTree>
@@ -9606,7 +9912,7 @@
             <a:fld id="{6700A58B-DD98-43D0-B791-721480A02982}" type="datetime1">
               <a:rPr lang="en-US" smtClean="0"/>
               <a:pPr/>
-              <a:t>1/5/21</a:t>
+              <a:t>1/10/21</a:t>
             </a:fld>
             <a:endParaRPr lang="en-US"/>
           </a:p>
@@ -9698,7 +10004,7 @@
             <a:fld id="{37290FF7-652B-4475-AEAB-8B1A5D23AE09}" type="slidenum">
               <a:rPr lang="en-US" smtClean="0"/>
               <a:pPr/>
-              <a:t>10</a:t>
+              <a:t>11</a:t>
             </a:fld>
             <a:endParaRPr lang="en-US"/>
           </a:p>
@@ -10031,7 +10337,7 @@
 </p:sld>
 </file>
 
-<file path=ppt/slides/slide11.xml><?xml version="1.0" encoding="utf-8"?>
+<file path=ppt/slides/slide12.xml><?xml version="1.0" encoding="utf-8"?>
 <p:sld xmlns:a="http://schemas.openxmlformats.org/drawingml/2006/main" xmlns:r="http://schemas.openxmlformats.org/officeDocument/2006/relationships" xmlns:p="http://schemas.openxmlformats.org/presentationml/2006/main">
   <p:cSld>
     <p:spTree>
@@ -10065,7 +10371,7 @@
           <a:p>
             <a:fld id="{6700A58B-DD98-43D0-B791-721480A02982}" type="datetime1">
               <a:rPr lang="en-US" smtClean="0"/>
-              <a:t>1/5/21</a:t>
+              <a:t>1/10/21</a:t>
             </a:fld>
             <a:endParaRPr lang="en-US"/>
           </a:p>
@@ -10139,7 +10445,7 @@
             <a:fld id="{37290FF7-652B-4475-AEAB-8B1A5D23AE09}" type="slidenum">
               <a:rPr lang="en-US" smtClean="0"/>
               <a:pPr/>
-              <a:t>11</a:t>
+              <a:t>12</a:t>
             </a:fld>
             <a:endParaRPr lang="en-US" dirty="0"/>
           </a:p>
@@ -12435,7 +12741,7 @@
 </p:sld>
 </file>
 
-<file path=ppt/slides/slide12.xml><?xml version="1.0" encoding="utf-8"?>
+<file path=ppt/slides/slide13.xml><?xml version="1.0" encoding="utf-8"?>
 <p:sld xmlns:a="http://schemas.openxmlformats.org/drawingml/2006/main" xmlns:r="http://schemas.openxmlformats.org/officeDocument/2006/relationships" xmlns:p="http://schemas.openxmlformats.org/presentationml/2006/main">
   <p:cSld>
     <p:spTree>
@@ -12469,7 +12775,7 @@
           <a:p>
             <a:fld id="{6700A58B-DD98-43D0-B791-721480A02982}" type="datetime1">
               <a:rPr lang="en-US" smtClean="0"/>
-              <a:t>1/5/21</a:t>
+              <a:t>1/10/21</a:t>
             </a:fld>
             <a:endParaRPr lang="en-US"/>
           </a:p>
@@ -12538,7 +12844,7 @@
             <a:fld id="{37290FF7-652B-4475-AEAB-8B1A5D23AE09}" type="slidenum">
               <a:rPr lang="en-US" smtClean="0"/>
               <a:pPr/>
-              <a:t>12</a:t>
+              <a:t>13</a:t>
             </a:fld>
             <a:endParaRPr lang="en-US" dirty="0"/>
           </a:p>
@@ -13750,7 +14056,7 @@
 </p:sld>
 </file>
 
-<file path=ppt/slides/slide13.xml><?xml version="1.0" encoding="utf-8"?>
+<file path=ppt/slides/slide14.xml><?xml version="1.0" encoding="utf-8"?>
 <p:sld xmlns:a="http://schemas.openxmlformats.org/drawingml/2006/main" xmlns:r="http://schemas.openxmlformats.org/officeDocument/2006/relationships" xmlns:p="http://schemas.openxmlformats.org/presentationml/2006/main">
   <p:cSld>
     <p:spTree>
@@ -13784,7 +14090,7 @@
           <a:p>
             <a:fld id="{6700A58B-DD98-43D0-B791-721480A02982}" type="datetime1">
               <a:rPr lang="en-US" smtClean="0"/>
-              <a:t>1/5/21</a:t>
+              <a:t>1/10/21</a:t>
             </a:fld>
             <a:endParaRPr lang="en-US"/>
           </a:p>
@@ -13853,7 +14159,7 @@
             <a:fld id="{37290FF7-652B-4475-AEAB-8B1A5D23AE09}" type="slidenum">
               <a:rPr lang="en-US" smtClean="0"/>
               <a:pPr/>
-              <a:t>13</a:t>
+              <a:t>14</a:t>
             </a:fld>
             <a:endParaRPr lang="en-US" dirty="0"/>
           </a:p>
@@ -14050,6 +14356,420 @@
       </p:grpSpPr>
       <p:sp>
         <p:nvSpPr>
+          <p:cNvPr id="2" name="Date Placeholder 1">
+            <a:extLst>
+              <a:ext uri="{FF2B5EF4-FFF2-40B4-BE49-F238E27FC236}">
+                <a16:creationId xmlns:a16="http://schemas.microsoft.com/office/drawing/2014/main" id="{C3CAEBDC-A022-42FC-8B92-BDD83F961C50}"/>
+              </a:ext>
+            </a:extLst>
+          </p:cNvPr>
+          <p:cNvSpPr>
+            <a:spLocks noGrp="1"/>
+          </p:cNvSpPr>
+          <p:nvPr>
+            <p:ph type="dt" sz="half" idx="10"/>
+          </p:nvPr>
+        </p:nvSpPr>
+        <p:spPr/>
+        <p:txBody>
+          <a:bodyPr/>
+          <a:lstStyle/>
+          <a:p>
+            <a:fld id="{6700A58B-DD98-43D0-B791-721480A02982}" type="datetime1">
+              <a:rPr lang="en-US" smtClean="0"/>
+              <a:pPr/>
+              <a:t>1/10/21</a:t>
+            </a:fld>
+            <a:endParaRPr lang="en-US"/>
+          </a:p>
+        </p:txBody>
+      </p:sp>
+      <p:sp>
+        <p:nvSpPr>
+          <p:cNvPr id="3" name="Title 2">
+            <a:extLst>
+              <a:ext uri="{FF2B5EF4-FFF2-40B4-BE49-F238E27FC236}">
+                <a16:creationId xmlns:a16="http://schemas.microsoft.com/office/drawing/2014/main" id="{37B78173-5947-4F35-9667-F563D71FF454}"/>
+              </a:ext>
+            </a:extLst>
+          </p:cNvPr>
+          <p:cNvSpPr>
+            <a:spLocks noGrp="1"/>
+          </p:cNvSpPr>
+          <p:nvPr>
+            <p:ph type="title"/>
+          </p:nvPr>
+        </p:nvSpPr>
+        <p:spPr>
+          <a:xfrm>
+            <a:off x="102476" y="365126"/>
+            <a:ext cx="8939048" cy="591477"/>
+          </a:xfrm>
+        </p:spPr>
+        <p:txBody>
+          <a:bodyPr/>
+          <a:lstStyle/>
+          <a:p>
+            <a:r>
+              <a:rPr lang="en-US" dirty="0" err="1"/>
+              <a:t>Zipf’s</a:t>
+            </a:r>
+            <a:r>
+              <a:rPr lang="en-US" dirty="0"/>
+              <a:t> Law: Our words  are less diverse than we think</a:t>
+            </a:r>
+          </a:p>
+        </p:txBody>
+      </p:sp>
+      <p:sp>
+        <p:nvSpPr>
+          <p:cNvPr id="14" name="Footer Placeholder 5">
+            <a:extLst>
+              <a:ext uri="{FF2B5EF4-FFF2-40B4-BE49-F238E27FC236}">
+                <a16:creationId xmlns:a16="http://schemas.microsoft.com/office/drawing/2014/main" id="{545F3542-284F-40CB-AA56-2D2C37D0AC7A}"/>
+              </a:ext>
+            </a:extLst>
+          </p:cNvPr>
+          <p:cNvSpPr>
+            <a:spLocks noGrp="1"/>
+          </p:cNvSpPr>
+          <p:nvPr>
+            <p:ph type="ftr" sz="quarter" idx="3"/>
+          </p:nvPr>
+        </p:nvSpPr>
+        <p:spPr/>
+        <p:txBody>
+          <a:bodyPr/>
+          <a:lstStyle/>
+          <a:p>
+            <a:r>
+              <a:rPr lang="en-US"/>
+              <a:t>Kwartler</a:t>
+            </a:r>
+            <a:endParaRPr lang="en-US" dirty="0"/>
+          </a:p>
+        </p:txBody>
+      </p:sp>
+      <p:sp>
+        <p:nvSpPr>
+          <p:cNvPr id="4" name="Slide Number Placeholder 3">
+            <a:extLst>
+              <a:ext uri="{FF2B5EF4-FFF2-40B4-BE49-F238E27FC236}">
+                <a16:creationId xmlns:a16="http://schemas.microsoft.com/office/drawing/2014/main" id="{A93F5FA2-CF1A-47D7-B82C-0D8B23383AC1}"/>
+              </a:ext>
+            </a:extLst>
+          </p:cNvPr>
+          <p:cNvSpPr>
+            <a:spLocks noGrp="1"/>
+          </p:cNvSpPr>
+          <p:nvPr>
+            <p:ph type="sldNum" sz="quarter" idx="4"/>
+          </p:nvPr>
+        </p:nvSpPr>
+        <p:spPr/>
+        <p:txBody>
+          <a:bodyPr/>
+          <a:lstStyle/>
+          <a:p>
+            <a:fld id="{37290FF7-652B-4475-AEAB-8B1A5D23AE09}" type="slidenum">
+              <a:rPr lang="en-US" smtClean="0"/>
+              <a:pPr/>
+              <a:t>2</a:t>
+            </a:fld>
+            <a:endParaRPr lang="en-US"/>
+          </a:p>
+        </p:txBody>
+      </p:sp>
+      <p:sp>
+        <p:nvSpPr>
+          <p:cNvPr id="9" name="Rectangle 8">
+            <a:extLst>
+              <a:ext uri="{FF2B5EF4-FFF2-40B4-BE49-F238E27FC236}">
+                <a16:creationId xmlns:a16="http://schemas.microsoft.com/office/drawing/2014/main" id="{0333D30C-20D1-44FC-B08B-ACA17FBC705D}"/>
+              </a:ext>
+            </a:extLst>
+          </p:cNvPr>
+          <p:cNvSpPr/>
+          <p:nvPr/>
+        </p:nvSpPr>
+        <p:spPr>
+          <a:xfrm>
+            <a:off x="240631" y="5593976"/>
+            <a:ext cx="6536687" cy="510989"/>
+          </a:xfrm>
+          <a:prstGeom prst="rect">
+            <a:avLst/>
+          </a:prstGeom>
+          <a:solidFill>
+            <a:schemeClr val="accent3"/>
+          </a:solidFill>
+          <a:ln>
+            <a:noFill/>
+          </a:ln>
+        </p:spPr>
+        <p:style>
+          <a:lnRef idx="2">
+            <a:schemeClr val="accent1">
+              <a:shade val="50000"/>
+            </a:schemeClr>
+          </a:lnRef>
+          <a:fillRef idx="1">
+            <a:schemeClr val="accent1"/>
+          </a:fillRef>
+          <a:effectRef idx="0">
+            <a:schemeClr val="accent1"/>
+          </a:effectRef>
+          <a:fontRef idx="minor">
+            <a:schemeClr val="lt1"/>
+          </a:fontRef>
+        </p:style>
+        <p:txBody>
+          <a:bodyPr rot="0" spcFirstLastPara="0" vertOverflow="overflow" horzOverflow="overflow" vert="horz" wrap="square" lIns="91440" tIns="45720" rIns="91440" bIns="45720" numCol="1" spcCol="0" rtlCol="0" fromWordArt="0" anchor="ctr" anchorCtr="0" forceAA="0" compatLnSpc="1">
+            <a:prstTxWarp prst="textNoShape">
+              <a:avLst/>
+            </a:prstTxWarp>
+            <a:noAutofit/>
+          </a:bodyPr>
+          <a:lstStyle/>
+          <a:p>
+            <a:pPr algn="ctr"/>
+            <a:r>
+              <a:rPr lang="en-US" sz="1400" dirty="0">
+                <a:solidFill>
+                  <a:schemeClr val="bg1"/>
+                </a:solidFill>
+              </a:rPr>
+              <a:t>Many words in natural language but also a steep decline in actual usage.  </a:t>
+            </a:r>
+          </a:p>
+          <a:p>
+            <a:pPr algn="ctr"/>
+            <a:r>
+              <a:rPr lang="en-US" sz="1400" dirty="0">
+                <a:solidFill>
+                  <a:schemeClr val="bg1"/>
+                </a:solidFill>
+              </a:rPr>
+              <a:t>Follows a predictable pattern.</a:t>
+            </a:r>
+          </a:p>
+        </p:txBody>
+      </p:sp>
+      <p:grpSp>
+        <p:nvGrpSpPr>
+          <p:cNvPr id="5" name="Group 4"/>
+          <p:cNvGrpSpPr/>
+          <p:nvPr/>
+        </p:nvGrpSpPr>
+        <p:grpSpPr>
+          <a:xfrm>
+            <a:off x="804505" y="1664188"/>
+            <a:ext cx="3689132" cy="2676504"/>
+            <a:chOff x="433759" y="2081047"/>
+            <a:chExt cx="3689132" cy="2676504"/>
+          </a:xfrm>
+        </p:grpSpPr>
+        <p:pic>
+          <p:nvPicPr>
+            <p:cNvPr id="7" name="Picture 2" descr="Image result for zipf's law">
+              <a:extLst>
+                <a:ext uri="{FF2B5EF4-FFF2-40B4-BE49-F238E27FC236}">
+                  <a16:creationId xmlns:a16="http://schemas.microsoft.com/office/drawing/2014/main" id="{E79F8C42-DDEC-484B-9AF4-5697CCAD2D27}"/>
+                </a:ext>
+              </a:extLst>
+            </p:cNvPr>
+            <p:cNvPicPr>
+              <a:picLocks noChangeAspect="1" noChangeArrowheads="1"/>
+            </p:cNvPicPr>
+            <p:nvPr/>
+          </p:nvPicPr>
+          <p:blipFill>
+            <a:blip r:embed="rId2" cstate="print">
+              <a:extLst>
+                <a:ext uri="{28A0092B-C50C-407E-A947-70E740481C1C}">
+                  <a14:useLocalDpi xmlns:a14="http://schemas.microsoft.com/office/drawing/2010/main" val="0"/>
+                </a:ext>
+              </a:extLst>
+            </a:blip>
+            <a:srcRect/>
+            <a:stretch>
+              <a:fillRect/>
+            </a:stretch>
+          </p:blipFill>
+          <p:spPr bwMode="auto">
+            <a:xfrm>
+              <a:off x="446024" y="2556649"/>
+              <a:ext cx="3664603" cy="2200902"/>
+            </a:xfrm>
+            <a:prstGeom prst="rect">
+              <a:avLst/>
+            </a:prstGeom>
+            <a:noFill/>
+            <a:extLst>
+              <a:ext uri="{909E8E84-426E-40DD-AFC4-6F175D3DCCD1}">
+                <a14:hiddenFill xmlns:a14="http://schemas.microsoft.com/office/drawing/2010/main">
+                  <a:solidFill>
+                    <a:srgbClr val="FFFFFF"/>
+                  </a:solidFill>
+                </a14:hiddenFill>
+              </a:ext>
+            </a:extLst>
+          </p:spPr>
+        </p:pic>
+        <p:sp>
+          <p:nvSpPr>
+            <p:cNvPr id="15" name="TextBox 14"/>
+            <p:cNvSpPr txBox="1"/>
+            <p:nvPr/>
+          </p:nvSpPr>
+          <p:spPr>
+            <a:xfrm>
+              <a:off x="433759" y="2081047"/>
+              <a:ext cx="3689132" cy="369332"/>
+            </a:xfrm>
+            <a:prstGeom prst="rect">
+              <a:avLst/>
+            </a:prstGeom>
+            <a:solidFill>
+              <a:schemeClr val="accent2"/>
+            </a:solidFill>
+          </p:spPr>
+          <p:txBody>
+            <a:bodyPr wrap="square" rtlCol="0">
+              <a:spAutoFit/>
+            </a:bodyPr>
+            <a:lstStyle/>
+            <a:p>
+              <a:r>
+                <a:rPr lang="en-US" dirty="0">
+                  <a:solidFill>
+                    <a:schemeClr val="bg1"/>
+                  </a:solidFill>
+                </a:rPr>
+                <a:t>Another Example </a:t>
+              </a:r>
+            </a:p>
+          </p:txBody>
+        </p:sp>
+      </p:grpSp>
+      <p:cxnSp>
+        <p:nvCxnSpPr>
+          <p:cNvPr id="12" name="Straight Connector 11">
+            <a:extLst>
+              <a:ext uri="{FF2B5EF4-FFF2-40B4-BE49-F238E27FC236}">
+                <a16:creationId xmlns:a16="http://schemas.microsoft.com/office/drawing/2014/main" id="{CEF19589-F4F2-C44D-8682-D4C73D133BE6}"/>
+              </a:ext>
+            </a:extLst>
+          </p:cNvPr>
+          <p:cNvCxnSpPr/>
+          <p:nvPr/>
+        </p:nvCxnSpPr>
+        <p:spPr>
+          <a:xfrm>
+            <a:off x="6798363" y="6549885"/>
+            <a:ext cx="0" cy="182880"/>
+          </a:xfrm>
+          <a:prstGeom prst="line">
+            <a:avLst/>
+          </a:prstGeom>
+          <a:ln>
+            <a:solidFill>
+              <a:schemeClr val="bg1">
+                <a:lumMod val="85000"/>
+              </a:schemeClr>
+            </a:solidFill>
+          </a:ln>
+        </p:spPr>
+        <p:style>
+          <a:lnRef idx="1">
+            <a:schemeClr val="accent1"/>
+          </a:lnRef>
+          <a:fillRef idx="0">
+            <a:schemeClr val="accent1"/>
+          </a:fillRef>
+          <a:effectRef idx="0">
+            <a:schemeClr val="accent1"/>
+          </a:effectRef>
+          <a:fontRef idx="minor">
+            <a:schemeClr val="tx1"/>
+          </a:fontRef>
+        </p:style>
+      </p:cxnSp>
+      <p:cxnSp>
+        <p:nvCxnSpPr>
+          <p:cNvPr id="13" name="Straight Connector 12">
+            <a:extLst>
+              <a:ext uri="{FF2B5EF4-FFF2-40B4-BE49-F238E27FC236}">
+                <a16:creationId xmlns:a16="http://schemas.microsoft.com/office/drawing/2014/main" id="{C39F794A-1735-C748-A1C4-E87AAEC8E987}"/>
+              </a:ext>
+            </a:extLst>
+          </p:cNvPr>
+          <p:cNvCxnSpPr/>
+          <p:nvPr/>
+        </p:nvCxnSpPr>
+        <p:spPr>
+          <a:xfrm>
+            <a:off x="7076661" y="4664763"/>
+            <a:ext cx="182880" cy="0"/>
+          </a:xfrm>
+          <a:prstGeom prst="line">
+            <a:avLst/>
+          </a:prstGeom>
+          <a:ln>
+            <a:solidFill>
+              <a:schemeClr val="bg1">
+                <a:lumMod val="85000"/>
+              </a:schemeClr>
+            </a:solidFill>
+          </a:ln>
+        </p:spPr>
+        <p:style>
+          <a:lnRef idx="1">
+            <a:schemeClr val="accent1"/>
+          </a:lnRef>
+          <a:fillRef idx="0">
+            <a:schemeClr val="accent1"/>
+          </a:fillRef>
+          <a:effectRef idx="0">
+            <a:schemeClr val="accent1"/>
+          </a:effectRef>
+          <a:fontRef idx="minor">
+            <a:schemeClr val="tx1"/>
+          </a:fontRef>
+        </p:style>
+      </p:cxnSp>
+    </p:spTree>
+    <p:extLst>
+      <p:ext uri="{BB962C8B-B14F-4D97-AF65-F5344CB8AC3E}">
+        <p14:creationId xmlns:p14="http://schemas.microsoft.com/office/powerpoint/2010/main" val="2151883977"/>
+      </p:ext>
+    </p:extLst>
+  </p:cSld>
+  <p:clrMapOvr>
+    <a:masterClrMapping/>
+  </p:clrMapOvr>
+</p:sld>
+</file>
+
+<file path=ppt/slides/slide3.xml><?xml version="1.0" encoding="utf-8"?>
+<p:sld xmlns:a="http://schemas.openxmlformats.org/drawingml/2006/main" xmlns:r="http://schemas.openxmlformats.org/officeDocument/2006/relationships" xmlns:p="http://schemas.openxmlformats.org/presentationml/2006/main">
+  <p:cSld>
+    <p:spTree>
+      <p:nvGrpSpPr>
+        <p:cNvPr id="1" name=""/>
+        <p:cNvGrpSpPr/>
+        <p:nvPr/>
+      </p:nvGrpSpPr>
+      <p:grpSpPr>
+        <a:xfrm>
+          <a:off x="0" y="0"/>
+          <a:ext cx="0" cy="0"/>
+          <a:chOff x="0" y="0"/>
+          <a:chExt cx="0" cy="0"/>
+        </a:xfrm>
+      </p:grpSpPr>
+      <p:sp>
+        <p:nvSpPr>
           <p:cNvPr id="2" name="Date Placeholder 1"/>
           <p:cNvSpPr>
             <a:spLocks noGrp="1"/>
@@ -14065,7 +14785,7 @@
           <a:p>
             <a:fld id="{6700A58B-DD98-43D0-B791-721480A02982}" type="datetime1">
               <a:rPr lang="en-US" smtClean="0"/>
-              <a:t>1/5/21</a:t>
+              <a:t>1/10/21</a:t>
             </a:fld>
             <a:endParaRPr lang="en-US"/>
           </a:p>
@@ -14142,7 +14862,7 @@
             <a:fld id="{37290FF7-652B-4475-AEAB-8B1A5D23AE09}" type="slidenum">
               <a:rPr lang="en-US" smtClean="0"/>
               <a:pPr/>
-              <a:t>2</a:t>
+              <a:t>3</a:t>
             </a:fld>
             <a:endParaRPr lang="en-US" dirty="0"/>
           </a:p>
@@ -14422,7 +15142,7 @@
 </p:sld>
 </file>
 
-<file path=ppt/slides/slide3.xml><?xml version="1.0" encoding="utf-8"?>
+<file path=ppt/slides/slide4.xml><?xml version="1.0" encoding="utf-8"?>
 <p:sld xmlns:a="http://schemas.openxmlformats.org/drawingml/2006/main" xmlns:r="http://schemas.openxmlformats.org/officeDocument/2006/relationships" xmlns:p="http://schemas.openxmlformats.org/presentationml/2006/main">
   <p:cSld>
     <p:spTree>
@@ -14462,7 +15182,7 @@
           <a:p>
             <a:fld id="{6700A58B-DD98-43D0-B791-721480A02982}" type="datetime1">
               <a:rPr lang="en-US" smtClean="0"/>
-              <a:t>1/5/21</a:t>
+              <a:t>1/10/21</a:t>
             </a:fld>
             <a:endParaRPr lang="en-US"/>
           </a:p>
@@ -14557,7 +15277,7 @@
             <a:fld id="{37290FF7-652B-4475-AEAB-8B1A5D23AE09}" type="slidenum">
               <a:rPr lang="en-US" smtClean="0"/>
               <a:pPr/>
-              <a:t>3</a:t>
+              <a:t>4</a:t>
             </a:fld>
             <a:endParaRPr lang="en-US" dirty="0"/>
           </a:p>
@@ -14997,7 +15717,7 @@
 </p:sld>
 </file>
 
-<file path=ppt/slides/slide4.xml><?xml version="1.0" encoding="utf-8"?>
+<file path=ppt/slides/slide5.xml><?xml version="1.0" encoding="utf-8"?>
 <p:sld xmlns:a="http://schemas.openxmlformats.org/drawingml/2006/main" xmlns:r="http://schemas.openxmlformats.org/officeDocument/2006/relationships" xmlns:p="http://schemas.openxmlformats.org/presentationml/2006/main">
   <p:cSld>
     <p:spTree>
@@ -15037,7 +15757,7 @@
           <a:p>
             <a:fld id="{6700A58B-DD98-43D0-B791-721480A02982}" type="datetime1">
               <a:rPr lang="en-US" smtClean="0"/>
-              <a:t>1/5/21</a:t>
+              <a:t>1/10/21</a:t>
             </a:fld>
             <a:endParaRPr lang="en-US"/>
           </a:p>
@@ -15129,7 +15849,7 @@
             <a:fld id="{37290FF7-652B-4475-AEAB-8B1A5D23AE09}" type="slidenum">
               <a:rPr lang="en-US" smtClean="0"/>
               <a:pPr/>
-              <a:t>4</a:t>
+              <a:t>5</a:t>
             </a:fld>
             <a:endParaRPr lang="en-US" dirty="0"/>
           </a:p>
@@ -15485,7 +16205,7 @@
 </p:sld>
 </file>
 
-<file path=ppt/slides/slide5.xml><?xml version="1.0" encoding="utf-8"?>
+<file path=ppt/slides/slide6.xml><?xml version="1.0" encoding="utf-8"?>
 <p:sld xmlns:a="http://schemas.openxmlformats.org/drawingml/2006/main" xmlns:r="http://schemas.openxmlformats.org/officeDocument/2006/relationships" xmlns:p="http://schemas.openxmlformats.org/presentationml/2006/main">
   <p:cSld>
     <p:bg>
@@ -15768,7 +16488,7 @@
                   <a:spcPts val="600"/>
                 </a:spcAft>
               </a:pPr>
-              <a:t>1/5/21</a:t>
+              <a:t>1/10/21</a:t>
             </a:fld>
             <a:endParaRPr lang="en-US" sz="1200">
               <a:solidFill>
@@ -15832,7 +16552,7 @@
                   <a:spcPts val="600"/>
                 </a:spcAft>
               </a:pPr>
-              <a:t>5</a:t>
+              <a:t>6</a:t>
             </a:fld>
             <a:endParaRPr lang="en-US" sz="1000">
               <a:solidFill>
@@ -15857,7 +16577,7 @@
 </p:sld>
 </file>
 
-<file path=ppt/slides/slide6.xml><?xml version="1.0" encoding="utf-8"?>
+<file path=ppt/slides/slide7.xml><?xml version="1.0" encoding="utf-8"?>
 <p:sld xmlns:a="http://schemas.openxmlformats.org/drawingml/2006/main" xmlns:r="http://schemas.openxmlformats.org/officeDocument/2006/relationships" xmlns:p="http://schemas.openxmlformats.org/presentationml/2006/main">
   <p:cSld>
     <p:spTree>
@@ -15891,7 +16611,7 @@
           <a:p>
             <a:fld id="{6700A58B-DD98-43D0-B791-721480A02982}" type="datetime1">
               <a:rPr lang="en-US" smtClean="0"/>
-              <a:t>1/5/21</a:t>
+              <a:t>1/10/21</a:t>
             </a:fld>
             <a:endParaRPr lang="en-US"/>
           </a:p>
@@ -15965,7 +16685,7 @@
             <a:fld id="{37290FF7-652B-4475-AEAB-8B1A5D23AE09}" type="slidenum">
               <a:rPr lang="en-US" smtClean="0"/>
               <a:pPr/>
-              <a:t>6</a:t>
+              <a:t>7</a:t>
             </a:fld>
             <a:endParaRPr lang="en-US" dirty="0"/>
           </a:p>
@@ -18311,7 +19031,7 @@
 </p:sld>
 </file>
 
-<file path=ppt/slides/slide7.xml><?xml version="1.0" encoding="utf-8"?>
+<file path=ppt/slides/slide8.xml><?xml version="1.0" encoding="utf-8"?>
 <p:sld xmlns:a="http://schemas.openxmlformats.org/drawingml/2006/main" xmlns:r="http://schemas.openxmlformats.org/officeDocument/2006/relationships" xmlns:p="http://schemas.openxmlformats.org/presentationml/2006/main">
   <p:cSld>
     <p:spTree>
@@ -18345,7 +19065,7 @@
           <a:p>
             <a:fld id="{6700A58B-DD98-43D0-B791-721480A02982}" type="datetime1">
               <a:rPr lang="en-US" smtClean="0"/>
-              <a:t>1/5/21</a:t>
+              <a:t>1/10/21</a:t>
             </a:fld>
             <a:endParaRPr lang="en-US"/>
           </a:p>
@@ -18414,7 +19134,7 @@
             <a:fld id="{37290FF7-652B-4475-AEAB-8B1A5D23AE09}" type="slidenum">
               <a:rPr lang="en-US" smtClean="0"/>
               <a:pPr/>
-              <a:t>7</a:t>
+              <a:t>8</a:t>
             </a:fld>
             <a:endParaRPr lang="en-US" dirty="0"/>
           </a:p>
@@ -18560,7 +19280,7 @@
 </p:sld>
 </file>
 
-<file path=ppt/slides/slide8.xml><?xml version="1.0" encoding="utf-8"?>
+<file path=ppt/slides/slide9.xml><?xml version="1.0" encoding="utf-8"?>
 <p:sld xmlns:a="http://schemas.openxmlformats.org/drawingml/2006/main" xmlns:r="http://schemas.openxmlformats.org/officeDocument/2006/relationships" xmlns:p="http://schemas.openxmlformats.org/presentationml/2006/main">
   <p:cSld>
     <p:spTree>
@@ -18594,7 +19314,7 @@
           <a:p>
             <a:fld id="{6700A58B-DD98-43D0-B791-721480A02982}" type="datetime1">
               <a:rPr lang="en-US" smtClean="0"/>
-              <a:t>1/5/21</a:t>
+              <a:t>1/10/21</a:t>
             </a:fld>
             <a:endParaRPr lang="en-US"/>
           </a:p>
@@ -18663,7 +19383,7 @@
             <a:fld id="{37290FF7-652B-4475-AEAB-8B1A5D23AE09}" type="slidenum">
               <a:rPr lang="en-US" smtClean="0"/>
               <a:pPr/>
-              <a:t>8</a:t>
+              <a:t>9</a:t>
             </a:fld>
             <a:endParaRPr lang="en-US" dirty="0"/>
           </a:p>
@@ -19648,244 +20368,6 @@
       <p:bldP spid="10" grpId="0" animBg="1"/>
     </p:bldLst>
   </p:timing>
-</p:sld>
-</file>
-
-<file path=ppt/slides/slide9.xml><?xml version="1.0" encoding="utf-8"?>
-<p:sld xmlns:a="http://schemas.openxmlformats.org/drawingml/2006/main" xmlns:r="http://schemas.openxmlformats.org/officeDocument/2006/relationships" xmlns:p="http://schemas.openxmlformats.org/presentationml/2006/main">
-  <p:cSld>
-    <p:spTree>
-      <p:nvGrpSpPr>
-        <p:cNvPr id="1" name=""/>
-        <p:cNvGrpSpPr/>
-        <p:nvPr/>
-      </p:nvGrpSpPr>
-      <p:grpSpPr>
-        <a:xfrm>
-          <a:off x="0" y="0"/>
-          <a:ext cx="0" cy="0"/>
-          <a:chOff x="0" y="0"/>
-          <a:chExt cx="0" cy="0"/>
-        </a:xfrm>
-      </p:grpSpPr>
-      <p:sp>
-        <p:nvSpPr>
-          <p:cNvPr id="2" name="Date Placeholder 1"/>
-          <p:cNvSpPr>
-            <a:spLocks noGrp="1"/>
-          </p:cNvSpPr>
-          <p:nvPr>
-            <p:ph type="dt" sz="half" idx="10"/>
-          </p:nvPr>
-        </p:nvSpPr>
-        <p:spPr/>
-        <p:txBody>
-          <a:bodyPr/>
-          <a:lstStyle/>
-          <a:p>
-            <a:fld id="{6700A58B-DD98-43D0-B791-721480A02982}" type="datetime1">
-              <a:rPr lang="en-US" smtClean="0"/>
-              <a:t>1/5/21</a:t>
-            </a:fld>
-            <a:endParaRPr lang="en-US"/>
-          </a:p>
-        </p:txBody>
-      </p:sp>
-      <p:sp>
-        <p:nvSpPr>
-          <p:cNvPr id="3" name="Title 2"/>
-          <p:cNvSpPr>
-            <a:spLocks noGrp="1"/>
-          </p:cNvSpPr>
-          <p:nvPr>
-            <p:ph type="title"/>
-          </p:nvPr>
-        </p:nvSpPr>
-        <p:spPr/>
-        <p:txBody>
-          <a:bodyPr/>
-          <a:lstStyle/>
-          <a:p>
-            <a:r>
-              <a:rPr lang="en-US" dirty="0"/>
-              <a:t>In this exercise we will examine song lyrics</a:t>
-            </a:r>
-          </a:p>
-        </p:txBody>
-      </p:sp>
-      <p:sp>
-        <p:nvSpPr>
-          <p:cNvPr id="4" name="Footer Placeholder 3"/>
-          <p:cNvSpPr>
-            <a:spLocks noGrp="1"/>
-          </p:cNvSpPr>
-          <p:nvPr>
-            <p:ph type="ftr" sz="quarter" idx="3"/>
-          </p:nvPr>
-        </p:nvSpPr>
-        <p:spPr/>
-        <p:txBody>
-          <a:bodyPr/>
-          <a:lstStyle/>
-          <a:p>
-            <a:r>
-              <a:rPr lang="en-US"/>
-              <a:t>Kwartler</a:t>
-            </a:r>
-            <a:endParaRPr lang="en-US" dirty="0"/>
-          </a:p>
-        </p:txBody>
-      </p:sp>
-      <p:sp>
-        <p:nvSpPr>
-          <p:cNvPr id="5" name="Slide Number Placeholder 4"/>
-          <p:cNvSpPr>
-            <a:spLocks noGrp="1"/>
-          </p:cNvSpPr>
-          <p:nvPr>
-            <p:ph type="sldNum" sz="quarter" idx="4"/>
-          </p:nvPr>
-        </p:nvSpPr>
-        <p:spPr/>
-        <p:txBody>
-          <a:bodyPr/>
-          <a:lstStyle/>
-          <a:p>
-            <a:fld id="{37290FF7-652B-4475-AEAB-8B1A5D23AE09}" type="slidenum">
-              <a:rPr lang="en-US" smtClean="0"/>
-              <a:pPr/>
-              <a:t>9</a:t>
-            </a:fld>
-            <a:endParaRPr lang="en-US" dirty="0"/>
-          </a:p>
-        </p:txBody>
-      </p:sp>
-      <p:pic>
-        <p:nvPicPr>
-          <p:cNvPr id="6" name="Picture 5">
-            <a:extLst>
-              <a:ext uri="{FF2B5EF4-FFF2-40B4-BE49-F238E27FC236}">
-                <a16:creationId xmlns:a16="http://schemas.microsoft.com/office/drawing/2014/main" id="{43321A06-9471-48C7-B813-FF43E5D3F26A}"/>
-              </a:ext>
-            </a:extLst>
-          </p:cNvPr>
-          <p:cNvPicPr>
-            <a:picLocks noChangeAspect="1"/>
-          </p:cNvPicPr>
-          <p:nvPr/>
-        </p:nvPicPr>
-        <p:blipFill>
-          <a:blip r:embed="rId2"/>
-          <a:stretch>
-            <a:fillRect/>
-          </a:stretch>
-        </p:blipFill>
-        <p:spPr>
-          <a:xfrm>
-            <a:off x="644442" y="1264820"/>
-            <a:ext cx="6315075" cy="3943350"/>
-          </a:xfrm>
-          <a:prstGeom prst="rect">
-            <a:avLst/>
-          </a:prstGeom>
-        </p:spPr>
-      </p:pic>
-      <p:cxnSp>
-        <p:nvCxnSpPr>
-          <p:cNvPr id="9" name="Straight Connector 8">
-            <a:extLst>
-              <a:ext uri="{FF2B5EF4-FFF2-40B4-BE49-F238E27FC236}">
-                <a16:creationId xmlns:a16="http://schemas.microsoft.com/office/drawing/2014/main" id="{EDB8A8B8-B746-EF49-AA0A-1EB9AE31C3E7}"/>
-              </a:ext>
-            </a:extLst>
-          </p:cNvPr>
-          <p:cNvCxnSpPr/>
-          <p:nvPr/>
-        </p:nvCxnSpPr>
-        <p:spPr>
-          <a:xfrm>
-            <a:off x="6798363" y="6549885"/>
-            <a:ext cx="0" cy="182880"/>
-          </a:xfrm>
-          <a:prstGeom prst="line">
-            <a:avLst/>
-          </a:prstGeom>
-          <a:ln>
-            <a:solidFill>
-              <a:schemeClr val="bg1">
-                <a:lumMod val="85000"/>
-              </a:schemeClr>
-            </a:solidFill>
-          </a:ln>
-        </p:spPr>
-        <p:style>
-          <a:lnRef idx="1">
-            <a:schemeClr val="accent1"/>
-          </a:lnRef>
-          <a:fillRef idx="0">
-            <a:schemeClr val="accent1"/>
-          </a:fillRef>
-          <a:effectRef idx="0">
-            <a:schemeClr val="accent1"/>
-          </a:effectRef>
-          <a:fontRef idx="minor">
-            <a:schemeClr val="tx1"/>
-          </a:fontRef>
-        </p:style>
-      </p:cxnSp>
-      <p:cxnSp>
-        <p:nvCxnSpPr>
-          <p:cNvPr id="10" name="Straight Connector 9">
-            <a:extLst>
-              <a:ext uri="{FF2B5EF4-FFF2-40B4-BE49-F238E27FC236}">
-                <a16:creationId xmlns:a16="http://schemas.microsoft.com/office/drawing/2014/main" id="{3E861DD3-4CF5-3F4B-96A7-76FFEDD98FCF}"/>
-              </a:ext>
-            </a:extLst>
-          </p:cNvPr>
-          <p:cNvCxnSpPr/>
-          <p:nvPr/>
-        </p:nvCxnSpPr>
-        <p:spPr>
-          <a:xfrm>
-            <a:off x="7076661" y="4664763"/>
-            <a:ext cx="182880" cy="0"/>
-          </a:xfrm>
-          <a:prstGeom prst="line">
-            <a:avLst/>
-          </a:prstGeom>
-          <a:ln>
-            <a:solidFill>
-              <a:schemeClr val="bg1">
-                <a:lumMod val="85000"/>
-              </a:schemeClr>
-            </a:solidFill>
-          </a:ln>
-        </p:spPr>
-        <p:style>
-          <a:lnRef idx="1">
-            <a:schemeClr val="accent1"/>
-          </a:lnRef>
-          <a:fillRef idx="0">
-            <a:schemeClr val="accent1"/>
-          </a:fillRef>
-          <a:effectRef idx="0">
-            <a:schemeClr val="accent1"/>
-          </a:effectRef>
-          <a:fontRef idx="minor">
-            <a:schemeClr val="tx1"/>
-          </a:fontRef>
-        </p:style>
-      </p:cxnSp>
-    </p:spTree>
-    <p:extLst>
-      <p:ext uri="{BB962C8B-B14F-4D97-AF65-F5344CB8AC3E}">
-        <p14:creationId xmlns:p14="http://schemas.microsoft.com/office/powerpoint/2010/main" val="2412190367"/>
-      </p:ext>
-    </p:extLst>
-  </p:cSld>
-  <p:clrMapOvr>
-    <a:masterClrMapping/>
-  </p:clrMapOvr>
 </p:sld>
 </file>
 

</xml_diff>